<commit_message>
fix ICC Profile for sRGB
</commit_message>
<xml_diff>
--- a/content/2017/06/11/imicc.pptx
+++ b/content/2017/06/11/imicc.pptx
@@ -8953,7 +8953,7 @@
           <a:lstStyle/>
           <a:p>
             <a:pPr algn="ctr"/>
-            <a:endParaRPr kumimoji="1" lang="ja-JP" altLang="en-US">
+            <a:endParaRPr kumimoji="1" lang="ja-JP" altLang="en-US" dirty="0">
               <a:latin typeface="ヒラギノ丸ゴ ProN W4"/>
               <a:ea typeface="ヒラギノ丸ゴ ProN W4"/>
               <a:cs typeface="ヒラギノ丸ゴ ProN W4"/>
@@ -9314,7 +9314,7 @@
         </p:nvSpPr>
         <p:spPr>
           <a:xfrm>
-            <a:off x="2584040" y="3563801"/>
+            <a:off x="2584040" y="2425881"/>
             <a:ext cx="982597" cy="533359"/>
           </a:xfrm>
           <a:prstGeom prst="rect">
@@ -9364,7 +9364,24 @@
               </a:rPr>
               <a:t>Profile</a:t>
             </a:r>
-            <a:endParaRPr kumimoji="1" lang="ja-JP" altLang="en-US" sz="1400" dirty="0">
+          </a:p>
+          <a:p>
+            <a:pPr algn="ctr"/>
+            <a:r>
+              <a:rPr kumimoji="1" lang="en-US" altLang="en-US" sz="1600" b="1" i="1" u="sng" spc="300" dirty="0" err="1" smtClean="0">
+                <a:solidFill>
+                  <a:srgbClr val="000000"/>
+                </a:solidFill>
+                <a:latin typeface="ヒラギノ丸ゴ ProN W4"/>
+                <a:ea typeface="ヒラギノ丸ゴ ProN W4"/>
+                <a:cs typeface="ヒラギノ丸ゴ ProN W4"/>
+              </a:rPr>
+              <a:t>sRGB</a:t>
+            </a:r>
+            <a:endParaRPr kumimoji="1" lang="ja-JP" altLang="en-US" sz="1600" b="1" i="1" u="sng" spc="300" dirty="0">
+              <a:solidFill>
+                <a:srgbClr val="000000"/>
+              </a:solidFill>
               <a:latin typeface="ヒラギノ丸ゴ ProN W4"/>
               <a:ea typeface="ヒラギノ丸ゴ ProN W4"/>
               <a:cs typeface="ヒラギノ丸ゴ ProN W4"/>
@@ -9380,7 +9397,7 @@
         </p:nvSpPr>
         <p:spPr>
           <a:xfrm>
-            <a:off x="2729018" y="3270461"/>
+            <a:off x="2729018" y="2132541"/>
             <a:ext cx="669792" cy="407385"/>
           </a:xfrm>
           <a:prstGeom prst="rect">
@@ -9805,8 +9822,8 @@
         </p:nvSpPr>
         <p:spPr>
           <a:xfrm>
-            <a:off x="1038714" y="1972618"/>
-            <a:ext cx="2696533" cy="1480842"/>
+            <a:off x="1038715" y="1972618"/>
+            <a:ext cx="1690304" cy="1480842"/>
           </a:xfrm>
           <a:prstGeom prst="mathMultiply">
             <a:avLst>
@@ -9859,8 +9876,8 @@
         </p:nvCxnSpPr>
         <p:spPr>
           <a:xfrm flipV="1">
-            <a:off x="3313607" y="3056111"/>
-            <a:ext cx="1908633" cy="1436218"/>
+            <a:off x="3466007" y="3072637"/>
+            <a:ext cx="1928953" cy="1499363"/>
           </a:xfrm>
           <a:prstGeom prst="straightConnector1">
             <a:avLst/>
@@ -9985,8 +10002,8 @@
         </p:nvSpPr>
         <p:spPr>
           <a:xfrm>
-            <a:off x="3313607" y="3039920"/>
-            <a:ext cx="1161338" cy="637926"/>
+            <a:off x="3124850" y="2968057"/>
+            <a:ext cx="1849120" cy="637926"/>
           </a:xfrm>
           <a:prstGeom prst="rect">
             <a:avLst/>
@@ -10016,6 +10033,28 @@
           <a:p>
             <a:pPr algn="ctr"/>
             <a:r>
+              <a:rPr kumimoji="1" lang="ja-JP" altLang="en-US" dirty="0" smtClean="0">
+                <a:solidFill>
+                  <a:srgbClr val="000000"/>
+                </a:solidFill>
+                <a:latin typeface="ヒラギノ丸ゴ ProN W4"/>
+                <a:ea typeface="ヒラギノ丸ゴ ProN W4"/>
+                <a:cs typeface="ヒラギノ丸ゴ ProN W4"/>
+              </a:rPr>
+              <a:t>元の色空間から</a:t>
+            </a:r>
+            <a:endParaRPr kumimoji="1" lang="en-US" altLang="ja-JP" dirty="0" smtClean="0">
+              <a:solidFill>
+                <a:srgbClr val="000000"/>
+              </a:solidFill>
+              <a:latin typeface="ヒラギノ丸ゴ ProN W4"/>
+              <a:ea typeface="ヒラギノ丸ゴ ProN W4"/>
+              <a:cs typeface="ヒラギノ丸ゴ ProN W4"/>
+            </a:endParaRPr>
+          </a:p>
+          <a:p>
+            <a:pPr algn="ctr"/>
+            <a:r>
               <a:rPr kumimoji="1" lang="en-US" altLang="ja-JP" dirty="0" err="1" smtClean="0">
                 <a:solidFill>
                   <a:srgbClr val="000000"/>
@@ -10026,17 +10065,6 @@
               </a:rPr>
               <a:t>sRGB</a:t>
             </a:r>
-            <a:endParaRPr kumimoji="1" lang="en-US" altLang="ja-JP" dirty="0" smtClean="0">
-              <a:solidFill>
-                <a:srgbClr val="000000"/>
-              </a:solidFill>
-              <a:latin typeface="ヒラギノ丸ゴ ProN W4"/>
-              <a:ea typeface="ヒラギノ丸ゴ ProN W4"/>
-              <a:cs typeface="ヒラギノ丸ゴ ProN W4"/>
-            </a:endParaRPr>
-          </a:p>
-          <a:p>
-            <a:pPr algn="ctr"/>
             <a:r>
               <a:rPr lang="ja-JP" altLang="en-US" dirty="0" smtClean="0">
                 <a:solidFill>
@@ -10046,12 +10074,163 @@
                 <a:ea typeface="ヒラギノ丸ゴ ProN W4"/>
                 <a:cs typeface="ヒラギノ丸ゴ ProN W4"/>
               </a:rPr>
-              <a:t>に変換</a:t>
+              <a:t>に</a:t>
+            </a:r>
+            <a:r>
+              <a:rPr lang="ja-JP" altLang="en-US" dirty="0" smtClean="0">
+                <a:solidFill>
+                  <a:srgbClr val="000000"/>
+                </a:solidFill>
+                <a:latin typeface="ヒラギノ丸ゴ ProN W4"/>
+                <a:ea typeface="ヒラギノ丸ゴ ProN W4"/>
+                <a:cs typeface="ヒラギノ丸ゴ ProN W4"/>
+              </a:rPr>
+              <a:t>変換</a:t>
             </a:r>
             <a:endParaRPr kumimoji="1" lang="ja-JP" altLang="en-US" dirty="0">
               <a:solidFill>
                 <a:srgbClr val="000000"/>
               </a:solidFill>
+              <a:latin typeface="ヒラギノ丸ゴ ProN W4"/>
+              <a:ea typeface="ヒラギノ丸ゴ ProN W4"/>
+              <a:cs typeface="ヒラギノ丸ゴ ProN W4"/>
+            </a:endParaRPr>
+          </a:p>
+        </p:txBody>
+      </p:sp>
+      <p:sp>
+        <p:nvSpPr>
+          <p:cNvPr id="18" name="正方形/長方形 17"/>
+          <p:cNvSpPr/>
+          <p:nvPr/>
+        </p:nvSpPr>
+        <p:spPr>
+          <a:xfrm>
+            <a:off x="2568613" y="3550323"/>
+            <a:ext cx="982597" cy="533359"/>
+          </a:xfrm>
+          <a:prstGeom prst="rect">
+            <a:avLst/>
+          </a:prstGeom>
+        </p:spPr>
+        <p:style>
+          <a:lnRef idx="1">
+            <a:schemeClr val="accent1"/>
+          </a:lnRef>
+          <a:fillRef idx="3">
+            <a:schemeClr val="accent1"/>
+          </a:fillRef>
+          <a:effectRef idx="2">
+            <a:schemeClr val="accent1"/>
+          </a:effectRef>
+          <a:fontRef idx="minor">
+            <a:schemeClr val="lt1"/>
+          </a:fontRef>
+        </p:style>
+        <p:txBody>
+          <a:bodyPr wrap="none" rtlCol="0" anchor="ctr"/>
+          <a:lstStyle/>
+          <a:p>
+            <a:pPr algn="ctr"/>
+            <a:r>
+              <a:rPr kumimoji="1" lang="en-US" altLang="ja-JP" sz="1400" dirty="0" smtClean="0">
+                <a:latin typeface="ヒラギノ丸ゴ ProN W4"/>
+                <a:ea typeface="ヒラギノ丸ゴ ProN W4"/>
+                <a:cs typeface="ヒラギノ丸ゴ ProN W4"/>
+              </a:rPr>
+              <a:t>ICC</a:t>
+            </a:r>
+            <a:r>
+              <a:rPr lang="en-US" altLang="en-US" sz="1400" dirty="0">
+                <a:latin typeface="ヒラギノ丸ゴ ProN W4"/>
+                <a:ea typeface="ヒラギノ丸ゴ ProN W4"/>
+                <a:cs typeface="ヒラギノ丸ゴ ProN W4"/>
+              </a:rPr>
+              <a:t> </a:t>
+            </a:r>
+            <a:r>
+              <a:rPr lang="en-US" altLang="en-US" sz="1400" dirty="0" smtClean="0">
+                <a:latin typeface="ヒラギノ丸ゴ ProN W4"/>
+                <a:ea typeface="ヒラギノ丸ゴ ProN W4"/>
+                <a:cs typeface="ヒラギノ丸ゴ ProN W4"/>
+              </a:rPr>
+              <a:t>Profile</a:t>
+            </a:r>
+            <a:endParaRPr kumimoji="1" lang="ja-JP" altLang="en-US" sz="1400" dirty="0">
+              <a:latin typeface="ヒラギノ丸ゴ ProN W4"/>
+              <a:ea typeface="ヒラギノ丸ゴ ProN W4"/>
+              <a:cs typeface="ヒラギノ丸ゴ ProN W4"/>
+            </a:endParaRPr>
+          </a:p>
+        </p:txBody>
+      </p:sp>
+      <p:sp>
+        <p:nvSpPr>
+          <p:cNvPr id="20" name="正方形/長方形 19"/>
+          <p:cNvSpPr/>
+          <p:nvPr/>
+        </p:nvSpPr>
+        <p:spPr>
+          <a:xfrm>
+            <a:off x="2713591" y="3256983"/>
+            <a:ext cx="669792" cy="407385"/>
+          </a:xfrm>
+          <a:prstGeom prst="rect">
+            <a:avLst/>
+          </a:prstGeom>
+          <a:gradFill>
+            <a:gsLst>
+              <a:gs pos="0">
+                <a:srgbClr val="FF6600"/>
+              </a:gs>
+              <a:gs pos="100000">
+                <a:schemeClr val="accent6">
+                  <a:lumMod val="60000"/>
+                  <a:lumOff val="40000"/>
+                </a:schemeClr>
+              </a:gs>
+            </a:gsLst>
+          </a:gradFill>
+        </p:spPr>
+        <p:style>
+          <a:lnRef idx="1">
+            <a:schemeClr val="accent1"/>
+          </a:lnRef>
+          <a:fillRef idx="3">
+            <a:schemeClr val="accent1"/>
+          </a:fillRef>
+          <a:effectRef idx="2">
+            <a:schemeClr val="accent1"/>
+          </a:effectRef>
+          <a:fontRef idx="minor">
+            <a:schemeClr val="lt1"/>
+          </a:fontRef>
+        </p:style>
+        <p:txBody>
+          <a:bodyPr rtlCol="0" anchor="ctr"/>
+          <a:lstStyle/>
+          <a:p>
+            <a:pPr algn="ctr"/>
+            <a:r>
+              <a:rPr kumimoji="1" lang="en-US" altLang="ja-JP" sz="1200" dirty="0" smtClean="0">
+                <a:latin typeface="ヒラギノ丸ゴ ProN W4"/>
+                <a:ea typeface="ヒラギノ丸ゴ ProN W4"/>
+                <a:cs typeface="ヒラギノ丸ゴ ProN W4"/>
+              </a:rPr>
+              <a:t>APP2</a:t>
+            </a:r>
+          </a:p>
+          <a:p>
+            <a:pPr algn="ctr"/>
+            <a:r>
+              <a:rPr lang="en-US" altLang="ja-JP" sz="1200" dirty="0" smtClean="0">
+                <a:latin typeface="ヒラギノ丸ゴ ProN W4"/>
+                <a:ea typeface="ヒラギノ丸ゴ ProN W4"/>
+                <a:cs typeface="ヒラギノ丸ゴ ProN W4"/>
+              </a:rPr>
+              <a:t>ffe2</a:t>
+            </a:r>
+            <a:endParaRPr kumimoji="1" lang="ja-JP" altLang="en-US" sz="1200" dirty="0">
               <a:latin typeface="ヒラギノ丸ゴ ProN W4"/>
               <a:ea typeface="ヒラギノ丸ゴ ProN W4"/>
               <a:cs typeface="ヒラギノ丸ゴ ProN W4"/>

</xml_diff>